<commit_message>
Moved from puphpet to Karun's created vagrant machine and changed the url to gameoflife.test, www.gameoflife.test
</commit_message>
<xml_diff>
--- a/cgol-oop-design-progression.pptx
+++ b/cgol-oop-design-progression.pptx
@@ -204,7 +204,7 @@
             <a:fld id="{D16E1819-E036-40F9-B507-840179F6A204}" type="datetimeFigureOut">
               <a:rPr lang="en-US" smtClean="0"/>
               <a:pPr/>
-              <a:t>2/3/2016</a:t>
+              <a:t>12/5/2018</a:t>
             </a:fld>
             <a:endParaRPr lang="en-US"/>
           </a:p>
@@ -652,7 +652,7 @@
             <a:fld id="{16A133DE-B352-4B03-851F-80C2446FF44B}" type="datetimeFigureOut">
               <a:rPr lang="en-US" smtClean="0"/>
               <a:pPr/>
-              <a:t>2/3/2016</a:t>
+              <a:t>12/5/2018</a:t>
             </a:fld>
             <a:endParaRPr lang="en-US"/>
           </a:p>
@@ -819,7 +819,7 @@
             <a:fld id="{16A133DE-B352-4B03-851F-80C2446FF44B}" type="datetimeFigureOut">
               <a:rPr lang="en-US" smtClean="0"/>
               <a:pPr/>
-              <a:t>2/3/2016</a:t>
+              <a:t>12/5/2018</a:t>
             </a:fld>
             <a:endParaRPr lang="en-US"/>
           </a:p>
@@ -996,7 +996,7 @@
             <a:fld id="{16A133DE-B352-4B03-851F-80C2446FF44B}" type="datetimeFigureOut">
               <a:rPr lang="en-US" smtClean="0"/>
               <a:pPr/>
-              <a:t>2/3/2016</a:t>
+              <a:t>12/5/2018</a:t>
             </a:fld>
             <a:endParaRPr lang="en-US"/>
           </a:p>
@@ -1163,7 +1163,7 @@
             <a:fld id="{16A133DE-B352-4B03-851F-80C2446FF44B}" type="datetimeFigureOut">
               <a:rPr lang="en-US" smtClean="0"/>
               <a:pPr/>
-              <a:t>2/3/2016</a:t>
+              <a:t>12/5/2018</a:t>
             </a:fld>
             <a:endParaRPr lang="en-US"/>
           </a:p>
@@ -1406,7 +1406,7 @@
             <a:fld id="{16A133DE-B352-4B03-851F-80C2446FF44B}" type="datetimeFigureOut">
               <a:rPr lang="en-US" smtClean="0"/>
               <a:pPr/>
-              <a:t>2/3/2016</a:t>
+              <a:t>12/5/2018</a:t>
             </a:fld>
             <a:endParaRPr lang="en-US"/>
           </a:p>
@@ -1691,7 +1691,7 @@
             <a:fld id="{16A133DE-B352-4B03-851F-80C2446FF44B}" type="datetimeFigureOut">
               <a:rPr lang="en-US" smtClean="0"/>
               <a:pPr/>
-              <a:t>2/3/2016</a:t>
+              <a:t>12/5/2018</a:t>
             </a:fld>
             <a:endParaRPr lang="en-US"/>
           </a:p>
@@ -2110,7 +2110,7 @@
             <a:fld id="{16A133DE-B352-4B03-851F-80C2446FF44B}" type="datetimeFigureOut">
               <a:rPr lang="en-US" smtClean="0"/>
               <a:pPr/>
-              <a:t>2/3/2016</a:t>
+              <a:t>12/5/2018</a:t>
             </a:fld>
             <a:endParaRPr lang="en-US"/>
           </a:p>
@@ -2225,7 +2225,7 @@
             <a:fld id="{16A133DE-B352-4B03-851F-80C2446FF44B}" type="datetimeFigureOut">
               <a:rPr lang="en-US" smtClean="0"/>
               <a:pPr/>
-              <a:t>2/3/2016</a:t>
+              <a:t>12/5/2018</a:t>
             </a:fld>
             <a:endParaRPr lang="en-US"/>
           </a:p>
@@ -2317,7 +2317,7 @@
             <a:fld id="{16A133DE-B352-4B03-851F-80C2446FF44B}" type="datetimeFigureOut">
               <a:rPr lang="en-US" smtClean="0"/>
               <a:pPr/>
-              <a:t>2/3/2016</a:t>
+              <a:t>12/5/2018</a:t>
             </a:fld>
             <a:endParaRPr lang="en-US"/>
           </a:p>
@@ -2591,7 +2591,7 @@
             <a:fld id="{16A133DE-B352-4B03-851F-80C2446FF44B}" type="datetimeFigureOut">
               <a:rPr lang="en-US" smtClean="0"/>
               <a:pPr/>
-              <a:t>2/3/2016</a:t>
+              <a:t>12/5/2018</a:t>
             </a:fld>
             <a:endParaRPr lang="en-US"/>
           </a:p>
@@ -2841,7 +2841,7 @@
             <a:fld id="{16A133DE-B352-4B03-851F-80C2446FF44B}" type="datetimeFigureOut">
               <a:rPr lang="en-US" smtClean="0"/>
               <a:pPr/>
-              <a:t>2/3/2016</a:t>
+              <a:t>12/5/2018</a:t>
             </a:fld>
             <a:endParaRPr lang="en-US"/>
           </a:p>
@@ -3051,7 +3051,7 @@
             <a:fld id="{16A133DE-B352-4B03-851F-80C2446FF44B}" type="datetimeFigureOut">
               <a:rPr lang="en-US" smtClean="0"/>
               <a:pPr/>
-              <a:t>2/3/2016</a:t>
+              <a:t>12/5/2018</a:t>
             </a:fld>
             <a:endParaRPr lang="en-US"/>
           </a:p>
@@ -3837,11 +3837,7 @@
           <a:p>
             <a:r>
               <a:rPr lang="en-US" dirty="0" smtClean="0"/>
-              <a:t>Invented by British </a:t>
-            </a:r>
-            <a:r>
-              <a:rPr lang="en-US" dirty="0" smtClean="0"/>
-              <a:t>mathematician </a:t>
+              <a:t>Invented by British mathematician </a:t>
             </a:r>
             <a:r>
               <a:rPr lang="en-US" dirty="0" smtClean="0">
@@ -3857,60 +3853,19 @@
           <a:p>
             <a:r>
               <a:rPr lang="en-US" dirty="0" smtClean="0"/>
-              <a:t>A</a:t>
-            </a:r>
+              <a:t>A zero-player game - its evolution is determined by its initial state (seed), requiring no further input.</a:t>
+            </a:r>
+          </a:p>
+          <a:p>
             <a:r>
               <a:rPr lang="en-US" dirty="0" smtClean="0"/>
-              <a:t> zero-player </a:t>
-            </a:r>
+              <a:t>The only user interaction with the game is for creating/selecting an initial configuration.</a:t>
+            </a:r>
+          </a:p>
+          <a:p>
             <a:r>
               <a:rPr lang="en-US" dirty="0" smtClean="0"/>
-              <a:t>game - its </a:t>
-            </a:r>
-            <a:r>
-              <a:rPr lang="en-US" dirty="0" smtClean="0"/>
-              <a:t>evolution is determined by its initial state (seed), requiring no further input.</a:t>
-            </a:r>
-          </a:p>
-          <a:p>
-            <a:r>
-              <a:rPr lang="en-US" dirty="0" smtClean="0"/>
-              <a:t>The only</a:t>
-            </a:r>
-            <a:r>
-              <a:rPr lang="en-US" dirty="0" smtClean="0"/>
-              <a:t> user interaction </a:t>
-            </a:r>
-            <a:r>
-              <a:rPr lang="en-US" dirty="0" smtClean="0"/>
-              <a:t>with the </a:t>
-            </a:r>
-            <a:r>
-              <a:rPr lang="en-US" dirty="0" smtClean="0"/>
-              <a:t>game</a:t>
-            </a:r>
-            <a:r>
-              <a:rPr lang="en-US" dirty="0" smtClean="0"/>
-              <a:t> is for creating/selecting </a:t>
-            </a:r>
-            <a:r>
-              <a:rPr lang="en-US" dirty="0" smtClean="0"/>
-              <a:t>an initial </a:t>
-            </a:r>
-            <a:r>
-              <a:rPr lang="en-US" dirty="0" smtClean="0"/>
-              <a:t>configuration.</a:t>
-            </a:r>
-            <a:endParaRPr lang="en-US" dirty="0" smtClean="0"/>
-          </a:p>
-          <a:p>
-            <a:r>
-              <a:rPr lang="en-US" dirty="0" smtClean="0"/>
-              <a:t>There are </a:t>
-            </a:r>
-            <a:r>
-              <a:rPr lang="en-US" dirty="0" smtClean="0"/>
-              <a:t>several </a:t>
+              <a:t>There are several </a:t>
             </a:r>
             <a:r>
               <a:rPr lang="en-US" dirty="0" smtClean="0">
@@ -4008,15 +3963,7 @@
           <a:p>
             <a:r>
               <a:rPr lang="en-US" dirty="0" smtClean="0"/>
-              <a:t>The game is a 2-D </a:t>
-            </a:r>
-            <a:r>
-              <a:rPr lang="en-US" dirty="0" smtClean="0"/>
-              <a:t>orthogonal board </a:t>
-            </a:r>
-            <a:r>
-              <a:rPr lang="en-US" dirty="0" smtClean="0"/>
-              <a:t>of square cells.</a:t>
+              <a:t>The game is a 2-D orthogonal board of square cells.</a:t>
             </a:r>
           </a:p>
           <a:p>

</xml_diff>